<commit_message>
Fixed typo in slide
</commit_message>
<xml_diff>
--- a/LectureSlides/05_ParameterEstimationAndLikelihood.pptx
+++ b/LectureSlides/05_ParameterEstimationAndLikelihood.pptx
@@ -258,7 +258,7 @@
           <a:p>
             <a:fld id="{FBE8413C-360A-45C8-86BB-6B0679E98A53}" type="datetimeFigureOut">
               <a:rPr lang="en-US" smtClean="0"/>
-              <a:t>8/16/2024</a:t>
+              <a:t>10/2/2024</a:t>
             </a:fld>
             <a:endParaRPr lang="en-US"/>
           </a:p>
@@ -788,7 +788,7 @@
           <a:p>
             <a:fld id="{241EB5C9-1307-BA42-ABA2-0BC069CD8E7F}" type="datetimeFigureOut">
               <a:rPr lang="en-US" smtClean="0"/>
-              <a:t>8/16/2024</a:t>
+              <a:t>10/2/2024</a:t>
             </a:fld>
             <a:endParaRPr lang="en-US"/>
           </a:p>
@@ -956,7 +956,7 @@
           <a:p>
             <a:fld id="{241EB5C9-1307-BA42-ABA2-0BC069CD8E7F}" type="datetimeFigureOut">
               <a:rPr lang="en-US" smtClean="0"/>
-              <a:t>8/16/2024</a:t>
+              <a:t>10/2/2024</a:t>
             </a:fld>
             <a:endParaRPr lang="en-US"/>
           </a:p>
@@ -1134,7 +1134,7 @@
           <a:p>
             <a:fld id="{241EB5C9-1307-BA42-ABA2-0BC069CD8E7F}" type="datetimeFigureOut">
               <a:rPr lang="en-US" smtClean="0"/>
-              <a:t>8/16/2024</a:t>
+              <a:t>10/2/2024</a:t>
             </a:fld>
             <a:endParaRPr lang="en-US"/>
           </a:p>
@@ -1302,7 +1302,7 @@
           <a:p>
             <a:fld id="{241EB5C9-1307-BA42-ABA2-0BC069CD8E7F}" type="datetimeFigureOut">
               <a:rPr lang="en-US" smtClean="0"/>
-              <a:t>8/16/2024</a:t>
+              <a:t>10/2/2024</a:t>
             </a:fld>
             <a:endParaRPr lang="en-US"/>
           </a:p>
@@ -1547,7 +1547,7 @@
           <a:p>
             <a:fld id="{241EB5C9-1307-BA42-ABA2-0BC069CD8E7F}" type="datetimeFigureOut">
               <a:rPr lang="en-US" smtClean="0"/>
-              <a:t>8/16/2024</a:t>
+              <a:t>10/2/2024</a:t>
             </a:fld>
             <a:endParaRPr lang="en-US"/>
           </a:p>
@@ -1832,7 +1832,7 @@
           <a:p>
             <a:fld id="{241EB5C9-1307-BA42-ABA2-0BC069CD8E7F}" type="datetimeFigureOut">
               <a:rPr lang="en-US" smtClean="0"/>
-              <a:t>8/16/2024</a:t>
+              <a:t>10/2/2024</a:t>
             </a:fld>
             <a:endParaRPr lang="en-US"/>
           </a:p>
@@ -2251,7 +2251,7 @@
           <a:p>
             <a:fld id="{241EB5C9-1307-BA42-ABA2-0BC069CD8E7F}" type="datetimeFigureOut">
               <a:rPr lang="en-US" smtClean="0"/>
-              <a:t>8/16/2024</a:t>
+              <a:t>10/2/2024</a:t>
             </a:fld>
             <a:endParaRPr lang="en-US"/>
           </a:p>
@@ -2368,7 +2368,7 @@
           <a:p>
             <a:fld id="{241EB5C9-1307-BA42-ABA2-0BC069CD8E7F}" type="datetimeFigureOut">
               <a:rPr lang="en-US" smtClean="0"/>
-              <a:t>8/16/2024</a:t>
+              <a:t>10/2/2024</a:t>
             </a:fld>
             <a:endParaRPr lang="en-US"/>
           </a:p>
@@ -2463,7 +2463,7 @@
           <a:p>
             <a:fld id="{241EB5C9-1307-BA42-ABA2-0BC069CD8E7F}" type="datetimeFigureOut">
               <a:rPr lang="en-US" smtClean="0"/>
-              <a:t>8/16/2024</a:t>
+              <a:t>10/2/2024</a:t>
             </a:fld>
             <a:endParaRPr lang="en-US"/>
           </a:p>
@@ -2738,7 +2738,7 @@
           <a:p>
             <a:fld id="{241EB5C9-1307-BA42-ABA2-0BC069CD8E7F}" type="datetimeFigureOut">
               <a:rPr lang="en-US" smtClean="0"/>
-              <a:t>8/16/2024</a:t>
+              <a:t>10/2/2024</a:t>
             </a:fld>
             <a:endParaRPr lang="en-US"/>
           </a:p>
@@ -2990,7 +2990,7 @@
           <a:p>
             <a:fld id="{241EB5C9-1307-BA42-ABA2-0BC069CD8E7F}" type="datetimeFigureOut">
               <a:rPr lang="en-US" smtClean="0"/>
-              <a:t>8/16/2024</a:t>
+              <a:t>10/2/2024</a:t>
             </a:fld>
             <a:endParaRPr lang="en-US"/>
           </a:p>
@@ -3201,7 +3201,7 @@
           <a:p>
             <a:fld id="{241EB5C9-1307-BA42-ABA2-0BC069CD8E7F}" type="datetimeFigureOut">
               <a:rPr lang="en-US" smtClean="0"/>
-              <a:t>8/16/2024</a:t>
+              <a:t>10/2/2024</a:t>
             </a:fld>
             <a:endParaRPr lang="en-US"/>
           </a:p>
@@ -4012,13 +4012,7 @@
                       <a:rPr>
                         <a:latin typeface="Cambria Math" panose="02040503050406030204" pitchFamily="18" charset="0"/>
                       </a:rPr>
-                      <m:t>0</m:t>
-                    </m:r>
-                    <m:r>
-                      <a:rPr>
-                        <a:latin typeface="Cambria Math" panose="02040503050406030204" pitchFamily="18" charset="0"/>
-                      </a:rPr>
-                      <m:t>≤</m:t>
+                      <m:t>0≤</m:t>
                     </m:r>
                     <m:r>
                       <a:rPr>
@@ -4030,13 +4024,7 @@
                       <a:rPr>
                         <a:latin typeface="Cambria Math" panose="02040503050406030204" pitchFamily="18" charset="0"/>
                       </a:rPr>
-                      <m:t>≤</m:t>
-                    </m:r>
-                    <m:r>
-                      <a:rPr>
-                        <a:latin typeface="Cambria Math" panose="02040503050406030204" pitchFamily="18" charset="0"/>
-                      </a:rPr>
-                      <m:t>1</m:t>
+                      <m:t>≤1</m:t>
                     </m:r>
                   </m:oMath>
                 </a14:m>
@@ -4224,13 +4212,7 @@
                                 <a:rPr>
                                   <a:latin typeface="Cambria Math" panose="02040503050406030204" pitchFamily="18" charset="0"/>
                                 </a:rPr>
-                                <m:t>1</m:t>
-                              </m:r>
-                              <m:r>
-                                <a:rPr>
-                                  <a:latin typeface="Cambria Math" panose="02040503050406030204" pitchFamily="18" charset="0"/>
-                                </a:rPr>
-                                <m:t>−</m:t>
+                                <m:t>1−</m:t>
                               </m:r>
                               <m:r>
                                 <a:rPr>
@@ -4481,13 +4463,7 @@
                             <a:rPr>
                               <a:latin typeface="Cambria Math" panose="02040503050406030204" pitchFamily="18" charset="0"/>
                             </a:rPr>
-                            <m:t>1</m:t>
-                          </m:r>
-                          <m:r>
-                            <a:rPr>
-                              <a:latin typeface="Cambria Math" panose="02040503050406030204" pitchFamily="18" charset="0"/>
-                            </a:rPr>
-                            <m:t>−</m:t>
+                            <m:t>1−</m:t>
                           </m:r>
                           <m:r>
                             <a:rPr>
@@ -5607,15 +5583,7 @@
             </a:pPr>
             <a:r>
               <a:rPr lang="en-US" b="1" dirty="0"/>
-              <a:t>Maximum </a:t>
-            </a:r>
-            <a:r>
-              <a:rPr lang="en-US" b="1" dirty="0" err="1"/>
-              <a:t>Likehihood</a:t>
-            </a:r>
-            <a:r>
-              <a:rPr lang="en-US" b="1" dirty="0"/>
-              <a:t> Estimator</a:t>
+              <a:t>Maximum Likelihood Estimator</a:t>
             </a:r>
             <a:endParaRPr dirty="0"/>
           </a:p>
@@ -19014,8 +18982,8 @@
           <a:chExt cx="0" cy="0"/>
         </a:xfrm>
       </p:grpSpPr>
-      <mc:AlternateContent xmlns:mc="http://schemas.openxmlformats.org/markup-compatibility/2006">
-        <mc:Choice xmlns:a14="http://schemas.microsoft.com/office/drawing/2010/main" Requires="a14">
+      <mc:AlternateContent xmlns:mc="http://schemas.openxmlformats.org/markup-compatibility/2006" xmlns:a14="http://schemas.microsoft.com/office/drawing/2010/main">
+        <mc:Choice Requires="a14">
           <p:sp>
             <p:nvSpPr>
               <p:cNvPr id="3" name="Content Placeholder 2"/>
@@ -19790,7 +19758,7 @@
                       <m:sSup>
                         <m:sSupPr>
                           <m:ctrlPr>
-                            <a:rPr lang="ar-AE" smtClean="0">
+                            <a:rPr lang="ar-AE" i="1" smtClean="0">
                               <a:latin typeface="Cambria Math" panose="02040503050406030204" pitchFamily="18" charset="0"/>
                             </a:rPr>
                           </m:ctrlPr>
@@ -20106,7 +20074,7 @@
             </p:txBody>
           </p:sp>
         </mc:Choice>
-        <mc:Fallback>
+        <mc:Fallback xmlns="">
           <p:sp>
             <p:nvSpPr>
               <p:cNvPr id="3" name="Content Placeholder 2"/>
@@ -21300,8 +21268,8 @@
           <a:chExt cx="0" cy="0"/>
         </a:xfrm>
       </p:grpSpPr>
-      <mc:AlternateContent xmlns:mc="http://schemas.openxmlformats.org/markup-compatibility/2006">
-        <mc:Choice xmlns:a14="http://schemas.microsoft.com/office/drawing/2010/main" Requires="a14">
+      <mc:AlternateContent xmlns:mc="http://schemas.openxmlformats.org/markup-compatibility/2006" xmlns:a14="http://schemas.microsoft.com/office/drawing/2010/main">
+        <mc:Choice Requires="a14">
           <p:sp>
             <p:nvSpPr>
               <p:cNvPr id="3" name="Content Placeholder 2"/>
@@ -21653,7 +21621,7 @@
             </p:txBody>
           </p:sp>
         </mc:Choice>
-        <mc:Fallback>
+        <mc:Fallback xmlns="">
           <p:sp>
             <p:nvSpPr>
               <p:cNvPr id="3" name="Content Placeholder 2"/>
@@ -23027,8 +22995,8 @@
           <a:chExt cx="0" cy="0"/>
         </a:xfrm>
       </p:grpSpPr>
-      <mc:AlternateContent xmlns:mc="http://schemas.openxmlformats.org/markup-compatibility/2006">
-        <mc:Choice xmlns:a14="http://schemas.microsoft.com/office/drawing/2010/main" Requires="a14">
+      <mc:AlternateContent xmlns:mc="http://schemas.openxmlformats.org/markup-compatibility/2006" xmlns:a14="http://schemas.microsoft.com/office/drawing/2010/main">
+        <mc:Choice Requires="a14">
           <p:sp>
             <p:nvSpPr>
               <p:cNvPr id="3" name="Content Placeholder 2"/>
@@ -23449,7 +23417,7 @@
             </p:txBody>
           </p:sp>
         </mc:Choice>
-        <mc:Fallback>
+        <mc:Fallback xmlns="">
           <p:sp>
             <p:nvSpPr>
               <p:cNvPr id="3" name="Content Placeholder 2"/>
@@ -24427,8 +24395,8 @@
           <a:chExt cx="0" cy="0"/>
         </a:xfrm>
       </p:grpSpPr>
-      <mc:AlternateContent xmlns:mc="http://schemas.openxmlformats.org/markup-compatibility/2006">
-        <mc:Choice xmlns:a14="http://schemas.microsoft.com/office/drawing/2010/main" Requires="a14">
+      <mc:AlternateContent xmlns:mc="http://schemas.openxmlformats.org/markup-compatibility/2006" xmlns:a14="http://schemas.microsoft.com/office/drawing/2010/main">
+        <mc:Choice Requires="a14">
           <p:sp>
             <p:nvSpPr>
               <p:cNvPr id="3" name="Content Placeholder 2"/>
@@ -25219,7 +25187,7 @@
             </p:txBody>
           </p:sp>
         </mc:Choice>
-        <mc:Fallback>
+        <mc:Fallback xmlns="">
           <p:sp>
             <p:nvSpPr>
               <p:cNvPr id="3" name="Content Placeholder 2"/>
@@ -25321,8 +25289,8 @@
           <a:chExt cx="0" cy="0"/>
         </a:xfrm>
       </p:grpSpPr>
-      <mc:AlternateContent xmlns:mc="http://schemas.openxmlformats.org/markup-compatibility/2006">
-        <mc:Choice xmlns:a14="http://schemas.microsoft.com/office/drawing/2010/main" Requires="a14">
+      <mc:AlternateContent xmlns:mc="http://schemas.openxmlformats.org/markup-compatibility/2006" xmlns:a14="http://schemas.microsoft.com/office/drawing/2010/main">
+        <mc:Choice Requires="a14">
           <p:sp>
             <p:nvSpPr>
               <p:cNvPr id="3" name="Content Placeholder 2"/>
@@ -26038,7 +26006,7 @@
             </p:txBody>
           </p:sp>
         </mc:Choice>
-        <mc:Fallback>
+        <mc:Fallback xmlns="">
           <p:sp>
             <p:nvSpPr>
               <p:cNvPr id="3" name="Content Placeholder 2"/>
@@ -26283,8 +26251,8 @@
           <a:chExt cx="0" cy="0"/>
         </a:xfrm>
       </p:grpSpPr>
-      <mc:AlternateContent xmlns:mc="http://schemas.openxmlformats.org/markup-compatibility/2006">
-        <mc:Choice xmlns:a14="http://schemas.microsoft.com/office/drawing/2010/main" Requires="a14">
+      <mc:AlternateContent xmlns:mc="http://schemas.openxmlformats.org/markup-compatibility/2006" xmlns:a14="http://schemas.microsoft.com/office/drawing/2010/main">
+        <mc:Choice Requires="a14">
           <p:sp>
             <p:nvSpPr>
               <p:cNvPr id="3" name="Content Placeholder 2"/>
@@ -26713,7 +26681,7 @@
             </p:txBody>
           </p:sp>
         </mc:Choice>
-        <mc:Fallback>
+        <mc:Fallback xmlns="">
           <p:sp>
             <p:nvSpPr>
               <p:cNvPr id="3" name="Content Placeholder 2"/>

</xml_diff>